<commit_message>
Fixes typo in reveal presentation
this fixes a typo: by modifying the the downloadable file and adding a
new image.
</commit_message>
<xml_diff>
--- a/img/presentation-photos/2016-BYU-Online.pptx
+++ b/img/presentation-photos/2016-BYU-Online.pptx
@@ -3210,7 +3210,7 @@
           <a:p>
             <a:fld id="{5B90787C-6E8E-4C56-BBC6-DD08C4A2A179}" type="datetimeFigureOut">
               <a:rPr lang="en-US" smtClean="0"/>
-              <a:t>6/2/2016</a:t>
+              <a:t>7/8/2016</a:t>
             </a:fld>
             <a:endParaRPr lang="en-US"/>
           </a:p>
@@ -4121,7 +4121,7 @@
             <a:fld id="{B61BEF0D-F0BB-DE4B-95CE-6DB70DBA9567}" type="datetimeFigureOut">
               <a:rPr lang="en-US" dirty="0"/>
               <a:pPr/>
-              <a:t>6/2/2016</a:t>
+              <a:t>7/8/2016</a:t>
             </a:fld>
             <a:endParaRPr lang="en-US" dirty="0"/>
           </a:p>
@@ -4456,7 +4456,7 @@
             <a:fld id="{B61BEF0D-F0BB-DE4B-95CE-6DB70DBA9567}" type="datetimeFigureOut">
               <a:rPr lang="en-US" dirty="0"/>
               <a:pPr/>
-              <a:t>6/2/2016</a:t>
+              <a:t>7/8/2016</a:t>
             </a:fld>
             <a:endParaRPr lang="en-US" dirty="0"/>
           </a:p>
@@ -4854,7 +4854,7 @@
             <a:fld id="{B61BEF0D-F0BB-DE4B-95CE-6DB70DBA9567}" type="datetimeFigureOut">
               <a:rPr lang="en-US" dirty="0"/>
               <a:pPr/>
-              <a:t>6/2/2016</a:t>
+              <a:t>7/8/2016</a:t>
             </a:fld>
             <a:endParaRPr lang="en-US" dirty="0"/>
           </a:p>
@@ -5187,7 +5187,7 @@
             <a:fld id="{B61BEF0D-F0BB-DE4B-95CE-6DB70DBA9567}" type="datetimeFigureOut">
               <a:rPr lang="en-US" dirty="0"/>
               <a:pPr/>
-              <a:t>6/2/2016</a:t>
+              <a:t>7/8/2016</a:t>
             </a:fld>
             <a:endParaRPr lang="en-US" dirty="0"/>
           </a:p>
@@ -5504,7 +5504,7 @@
             <a:fld id="{B61BEF0D-F0BB-DE4B-95CE-6DB70DBA9567}" type="datetimeFigureOut">
               <a:rPr lang="en-US" dirty="0"/>
               <a:pPr/>
-              <a:t>6/2/2016</a:t>
+              <a:t>7/8/2016</a:t>
             </a:fld>
             <a:endParaRPr lang="en-US" dirty="0"/>
           </a:p>
@@ -5897,7 +5897,7 @@
             <a:fld id="{B61BEF0D-F0BB-DE4B-95CE-6DB70DBA9567}" type="datetimeFigureOut">
               <a:rPr lang="en-US" dirty="0"/>
               <a:pPr/>
-              <a:t>6/2/2016</a:t>
+              <a:t>7/8/2016</a:t>
             </a:fld>
             <a:endParaRPr lang="en-US" dirty="0"/>
           </a:p>
@@ -6151,7 +6151,7 @@
             <a:fld id="{B61BEF0D-F0BB-DE4B-95CE-6DB70DBA9567}" type="datetimeFigureOut">
               <a:rPr lang="en-US" dirty="0"/>
               <a:pPr/>
-              <a:t>6/2/2016</a:t>
+              <a:t>7/8/2016</a:t>
             </a:fld>
             <a:endParaRPr lang="en-US" dirty="0"/>
           </a:p>
@@ -6410,7 +6410,7 @@
             <a:fld id="{B61BEF0D-F0BB-DE4B-95CE-6DB70DBA9567}" type="datetimeFigureOut">
               <a:rPr lang="en-US" dirty="0"/>
               <a:pPr/>
-              <a:t>6/2/2016</a:t>
+              <a:t>7/8/2016</a:t>
             </a:fld>
             <a:endParaRPr lang="en-US" dirty="0"/>
           </a:p>
@@ -6669,7 +6669,7 @@
             <a:fld id="{B61BEF0D-F0BB-DE4B-95CE-6DB70DBA9567}" type="datetimeFigureOut">
               <a:rPr lang="en-US" dirty="0"/>
               <a:pPr/>
-              <a:t>6/2/2016</a:t>
+              <a:t>7/8/2016</a:t>
             </a:fld>
             <a:endParaRPr lang="en-US" dirty="0"/>
           </a:p>
@@ -6995,7 +6995,7 @@
             <a:fld id="{B61BEF0D-F0BB-DE4B-95CE-6DB70DBA9567}" type="datetimeFigureOut">
               <a:rPr lang="en-US" dirty="0"/>
               <a:pPr/>
-              <a:t>6/2/2016</a:t>
+              <a:t>7/8/2016</a:t>
             </a:fld>
             <a:endParaRPr lang="en-US" dirty="0"/>
           </a:p>
@@ -7315,7 +7315,7 @@
             <a:fld id="{B61BEF0D-F0BB-DE4B-95CE-6DB70DBA9567}" type="datetimeFigureOut">
               <a:rPr lang="en-US" dirty="0"/>
               <a:pPr/>
-              <a:t>6/2/2016</a:t>
+              <a:t>7/8/2016</a:t>
             </a:fld>
             <a:endParaRPr lang="en-US" dirty="0"/>
           </a:p>
@@ -7769,7 +7769,7 @@
             <a:fld id="{B61BEF0D-F0BB-DE4B-95CE-6DB70DBA9567}" type="datetimeFigureOut">
               <a:rPr lang="en-US" dirty="0"/>
               <a:pPr/>
-              <a:t>6/2/2016</a:t>
+              <a:t>7/8/2016</a:t>
             </a:fld>
             <a:endParaRPr lang="en-US" dirty="0"/>
           </a:p>
@@ -7971,7 +7971,7 @@
             <a:fld id="{B61BEF0D-F0BB-DE4B-95CE-6DB70DBA9567}" type="datetimeFigureOut">
               <a:rPr lang="en-US" dirty="0"/>
               <a:pPr/>
-              <a:t>6/2/2016</a:t>
+              <a:t>7/8/2016</a:t>
             </a:fld>
             <a:endParaRPr lang="en-US" dirty="0"/>
           </a:p>
@@ -8145,7 +8145,7 @@
             <a:fld id="{B61BEF0D-F0BB-DE4B-95CE-6DB70DBA9567}" type="datetimeFigureOut">
               <a:rPr lang="en-US" dirty="0"/>
               <a:pPr/>
-              <a:t>6/2/2016</a:t>
+              <a:t>7/8/2016</a:t>
             </a:fld>
             <a:endParaRPr lang="en-US" dirty="0"/>
           </a:p>
@@ -8475,7 +8475,7 @@
             <a:fld id="{B61BEF0D-F0BB-DE4B-95CE-6DB70DBA9567}" type="datetimeFigureOut">
               <a:rPr lang="en-US" dirty="0"/>
               <a:pPr/>
-              <a:t>6/2/2016</a:t>
+              <a:t>7/8/2016</a:t>
             </a:fld>
             <a:endParaRPr lang="en-US" dirty="0"/>
           </a:p>
@@ -8817,7 +8817,7 @@
             <a:fld id="{B61BEF0D-F0BB-DE4B-95CE-6DB70DBA9567}" type="datetimeFigureOut">
               <a:rPr lang="en-US" dirty="0"/>
               <a:pPr/>
-              <a:t>6/2/2016</a:t>
+              <a:t>7/8/2016</a:t>
             </a:fld>
             <a:endParaRPr lang="en-US" dirty="0"/>
           </a:p>
@@ -10931,7 +10931,7 @@
             <a:fld id="{B61BEF0D-F0BB-DE4B-95CE-6DB70DBA9567}" type="datetimeFigureOut">
               <a:rPr lang="en-US" dirty="0"/>
               <a:pPr/>
-              <a:t>6/2/2016</a:t>
+              <a:t>7/8/2016</a:t>
             </a:fld>
             <a:endParaRPr lang="en-US" dirty="0"/>
           </a:p>
@@ -11499,7 +11499,15 @@
             <a:pPr algn="ctr"/>
             <a:r>
               <a:rPr lang="en-US" sz="3600" dirty="0" smtClean="0"/>
-              <a:t>What it Is and</a:t>
+              <a:t>What </a:t>
+            </a:r>
+            <a:r>
+              <a:rPr lang="en-US" sz="3600" smtClean="0"/>
+              <a:t>it is </a:t>
+            </a:r>
+            <a:r>
+              <a:rPr lang="en-US" sz="3600" dirty="0" smtClean="0"/>
+              <a:t>and</a:t>
             </a:r>
             <a:r>
               <a:rPr lang="en-US" sz="3600" dirty="0"/>
@@ -11509,6 +11517,7 @@
               <a:rPr lang="en-US" sz="3600" dirty="0" smtClean="0"/>
               <a:t>What it is Not</a:t>
             </a:r>
+            <a:endParaRPr lang="en-US" sz="3600" dirty="0" smtClean="0"/>
           </a:p>
           <a:p>
             <a:pPr algn="ctr"/>

</xml_diff>